<commit_message>
Homepage done for now
</commit_message>
<xml_diff>
--- a/doraemon.pptx
+++ b/doraemon.pptx
@@ -7,6 +7,7 @@
   <p:sldIdLst>
     <p:sldId id="256" r:id="rId2"/>
     <p:sldId id="257" r:id="rId3"/>
+    <p:sldId id="258" r:id="rId4"/>
   </p:sldIdLst>
   <p:sldSz cx="12192000" cy="6858000"/>
   <p:notesSz cx="6858000" cy="9144000"/>
@@ -105,6 +106,11 @@
       </a:defRPr>
     </a:lvl9pPr>
   </p:defaultTextStyle>
+  <p:extLst>
+    <p:ext uri="{EFAFB233-063F-42B5-8137-9DF3F51BA10A}">
+      <p15:sldGuideLst xmlns:p15="http://schemas.microsoft.com/office/powerpoint/2012/main"/>
+    </p:ext>
+  </p:extLst>
 </p:presentation>
 </file>
 
@@ -256,7 +262,7 @@
           <a:lstStyle/>
           <a:p>
             <a:fld id="{367EDACB-A12D-BB4C-908C-A66189AF4DB5}" type="datetimeFigureOut">
-              <a:t>2021/05/18</a:t>
+              <a:t>2021/05/25</a:t>
             </a:fld>
             <a:endParaRPr lang="en-JP"/>
           </a:p>
@@ -454,7 +460,7 @@
           <a:lstStyle/>
           <a:p>
             <a:fld id="{367EDACB-A12D-BB4C-908C-A66189AF4DB5}" type="datetimeFigureOut">
-              <a:t>2021/05/18</a:t>
+              <a:t>2021/05/25</a:t>
             </a:fld>
             <a:endParaRPr lang="en-JP"/>
           </a:p>
@@ -662,7 +668,7 @@
           <a:lstStyle/>
           <a:p>
             <a:fld id="{367EDACB-A12D-BB4C-908C-A66189AF4DB5}" type="datetimeFigureOut">
-              <a:t>2021/05/18</a:t>
+              <a:t>2021/05/25</a:t>
             </a:fld>
             <a:endParaRPr lang="en-JP"/>
           </a:p>
@@ -860,7 +866,7 @@
           <a:lstStyle/>
           <a:p>
             <a:fld id="{367EDACB-A12D-BB4C-908C-A66189AF4DB5}" type="datetimeFigureOut">
-              <a:t>2021/05/18</a:t>
+              <a:t>2021/05/25</a:t>
             </a:fld>
             <a:endParaRPr lang="en-JP"/>
           </a:p>
@@ -1134,7 +1140,7 @@
           <a:lstStyle/>
           <a:p>
             <a:fld id="{367EDACB-A12D-BB4C-908C-A66189AF4DB5}" type="datetimeFigureOut">
-              <a:t>2021/05/18</a:t>
+              <a:t>2021/05/25</a:t>
             </a:fld>
             <a:endParaRPr lang="en-JP"/>
           </a:p>
@@ -1400,7 +1406,7 @@
           <a:lstStyle/>
           <a:p>
             <a:fld id="{367EDACB-A12D-BB4C-908C-A66189AF4DB5}" type="datetimeFigureOut">
-              <a:t>2021/05/18</a:t>
+              <a:t>2021/05/25</a:t>
             </a:fld>
             <a:endParaRPr lang="en-JP"/>
           </a:p>
@@ -1813,7 +1819,7 @@
           <a:lstStyle/>
           <a:p>
             <a:fld id="{367EDACB-A12D-BB4C-908C-A66189AF4DB5}" type="datetimeFigureOut">
-              <a:t>2021/05/18</a:t>
+              <a:t>2021/05/25</a:t>
             </a:fld>
             <a:endParaRPr lang="en-JP"/>
           </a:p>
@@ -1953,7 +1959,7 @@
           <a:lstStyle/>
           <a:p>
             <a:fld id="{367EDACB-A12D-BB4C-908C-A66189AF4DB5}" type="datetimeFigureOut">
-              <a:t>2021/05/18</a:t>
+              <a:t>2021/05/25</a:t>
             </a:fld>
             <a:endParaRPr lang="en-JP"/>
           </a:p>
@@ -2064,7 +2070,7 @@
           <a:lstStyle/>
           <a:p>
             <a:fld id="{367EDACB-A12D-BB4C-908C-A66189AF4DB5}" type="datetimeFigureOut">
-              <a:t>2021/05/18</a:t>
+              <a:t>2021/05/25</a:t>
             </a:fld>
             <a:endParaRPr lang="en-JP"/>
           </a:p>
@@ -2375,7 +2381,7 @@
           <a:lstStyle/>
           <a:p>
             <a:fld id="{367EDACB-A12D-BB4C-908C-A66189AF4DB5}" type="datetimeFigureOut">
-              <a:t>2021/05/18</a:t>
+              <a:t>2021/05/25</a:t>
             </a:fld>
             <a:endParaRPr lang="en-JP"/>
           </a:p>
@@ -2662,7 +2668,7 @@
           <a:lstStyle/>
           <a:p>
             <a:fld id="{367EDACB-A12D-BB4C-908C-A66189AF4DB5}" type="datetimeFigureOut">
-              <a:t>2021/05/18</a:t>
+              <a:t>2021/05/25</a:t>
             </a:fld>
             <a:endParaRPr lang="en-JP"/>
           </a:p>
@@ -2903,7 +2909,7 @@
           </a:lstStyle>
           <a:p>
             <a:fld id="{367EDACB-A12D-BB4C-908C-A66189AF4DB5}" type="datetimeFigureOut">
-              <a:t>2021/05/18</a:t>
+              <a:t>2021/05/25</a:t>
             </a:fld>
             <a:endParaRPr lang="en-JP"/>
           </a:p>
@@ -4124,6 +4130,181 @@
 </p:sld>
 </file>
 
+<file path=ppt/slides/slide3.xml><?xml version="1.0" encoding="utf-8"?>
+<p:sld xmlns:a="http://schemas.openxmlformats.org/drawingml/2006/main" xmlns:r="http://schemas.openxmlformats.org/officeDocument/2006/relationships" xmlns:p="http://schemas.openxmlformats.org/presentationml/2006/main">
+  <p:cSld>
+    <p:spTree>
+      <p:nvGrpSpPr>
+        <p:cNvPr id="1" name=""/>
+        <p:cNvGrpSpPr/>
+        <p:nvPr/>
+      </p:nvGrpSpPr>
+      <p:grpSpPr>
+        <a:xfrm>
+          <a:off x="0" y="0"/>
+          <a:ext cx="0" cy="0"/>
+          <a:chOff x="0" y="0"/>
+          <a:chExt cx="0" cy="0"/>
+        </a:xfrm>
+      </p:grpSpPr>
+      <p:pic>
+        <p:nvPicPr>
+          <p:cNvPr id="5" name="Picture 4">
+            <a:extLst>
+              <a:ext uri="{FF2B5EF4-FFF2-40B4-BE49-F238E27FC236}">
+                <a16:creationId xmlns:a16="http://schemas.microsoft.com/office/drawing/2014/main" id="{A5C4C6A7-EC25-8F49-AAC1-A7B2D4D7E5F1}"/>
+              </a:ext>
+            </a:extLst>
+          </p:cNvPr>
+          <p:cNvPicPr>
+            <a:picLocks noChangeAspect="1"/>
+          </p:cNvPicPr>
+          <p:nvPr/>
+        </p:nvPicPr>
+        <p:blipFill rotWithShape="1">
+          <a:blip r:embed="rId2"/>
+          <a:srcRect l="8324" t="527" r="6227" b="-1"/>
+          <a:stretch/>
+        </p:blipFill>
+        <p:spPr>
+          <a:xfrm>
+            <a:off x="7137640" y="1819232"/>
+            <a:ext cx="2231579" cy="2780789"/>
+          </a:xfrm>
+          <a:prstGeom prst="rect">
+            <a:avLst/>
+          </a:prstGeom>
+        </p:spPr>
+      </p:pic>
+      <p:pic>
+        <p:nvPicPr>
+          <p:cNvPr id="7" name="Picture 6">
+            <a:extLst>
+              <a:ext uri="{FF2B5EF4-FFF2-40B4-BE49-F238E27FC236}">
+                <a16:creationId xmlns:a16="http://schemas.microsoft.com/office/drawing/2014/main" id="{F1CED889-6D1F-8147-9ED2-30D288EC4DE6}"/>
+              </a:ext>
+            </a:extLst>
+          </p:cNvPr>
+          <p:cNvPicPr>
+            <a:picLocks noChangeAspect="1"/>
+          </p:cNvPicPr>
+          <p:nvPr/>
+        </p:nvPicPr>
+        <p:blipFill rotWithShape="1">
+          <a:blip r:embed="rId3"/>
+          <a:srcRect l="8148" r="5556"/>
+          <a:stretch/>
+        </p:blipFill>
+        <p:spPr>
+          <a:xfrm>
+            <a:off x="4883958" y="1819232"/>
+            <a:ext cx="2253682" cy="2780788"/>
+          </a:xfrm>
+          <a:prstGeom prst="rect">
+            <a:avLst/>
+          </a:prstGeom>
+        </p:spPr>
+      </p:pic>
+      <p:pic>
+        <p:nvPicPr>
+          <p:cNvPr id="9" name="Picture 8">
+            <a:extLst>
+              <a:ext uri="{FF2B5EF4-FFF2-40B4-BE49-F238E27FC236}">
+                <a16:creationId xmlns:a16="http://schemas.microsoft.com/office/drawing/2014/main" id="{1613AE4C-8B70-DB4F-93B1-698B908CEA13}"/>
+              </a:ext>
+            </a:extLst>
+          </p:cNvPr>
+          <p:cNvPicPr>
+            <a:picLocks noChangeAspect="1"/>
+          </p:cNvPicPr>
+          <p:nvPr/>
+        </p:nvPicPr>
+        <p:blipFill rotWithShape="1">
+          <a:blip r:embed="rId4"/>
+          <a:srcRect l="8373" t="561" r="5936"/>
+          <a:stretch/>
+        </p:blipFill>
+        <p:spPr>
+          <a:xfrm>
+            <a:off x="2652379" y="1819233"/>
+            <a:ext cx="2231579" cy="2772503"/>
+          </a:xfrm>
+          <a:prstGeom prst="rect">
+            <a:avLst/>
+          </a:prstGeom>
+        </p:spPr>
+      </p:pic>
+      <p:pic>
+        <p:nvPicPr>
+          <p:cNvPr id="11" name="Picture 10">
+            <a:extLst>
+              <a:ext uri="{FF2B5EF4-FFF2-40B4-BE49-F238E27FC236}">
+                <a16:creationId xmlns:a16="http://schemas.microsoft.com/office/drawing/2014/main" id="{9138F5F7-E9D8-2B43-9B68-177C5D9FA476}"/>
+              </a:ext>
+            </a:extLst>
+          </p:cNvPr>
+          <p:cNvPicPr>
+            <a:picLocks noChangeAspect="1"/>
+          </p:cNvPicPr>
+          <p:nvPr/>
+        </p:nvPicPr>
+        <p:blipFill rotWithShape="1">
+          <a:blip r:embed="rId5"/>
+          <a:srcRect l="5219" t="2072"/>
+          <a:stretch/>
+        </p:blipFill>
+        <p:spPr>
+          <a:xfrm>
+            <a:off x="9369219" y="1819232"/>
+            <a:ext cx="2475309" cy="2780789"/>
+          </a:xfrm>
+          <a:prstGeom prst="rect">
+            <a:avLst/>
+          </a:prstGeom>
+        </p:spPr>
+      </p:pic>
+      <p:pic>
+        <p:nvPicPr>
+          <p:cNvPr id="13" name="Picture 12">
+            <a:extLst>
+              <a:ext uri="{FF2B5EF4-FFF2-40B4-BE49-F238E27FC236}">
+                <a16:creationId xmlns:a16="http://schemas.microsoft.com/office/drawing/2014/main" id="{079F1A81-8D57-4E4E-9CFC-4AE731F7A7E7}"/>
+              </a:ext>
+            </a:extLst>
+          </p:cNvPr>
+          <p:cNvPicPr>
+            <a:picLocks noChangeAspect="1"/>
+          </p:cNvPicPr>
+          <p:nvPr/>
+        </p:nvPicPr>
+        <p:blipFill rotWithShape="1">
+          <a:blip r:embed="rId6"/>
+          <a:srcRect t="855" r="6026" b="1"/>
+          <a:stretch/>
+        </p:blipFill>
+        <p:spPr>
+          <a:xfrm>
+            <a:off x="204268" y="1819234"/>
+            <a:ext cx="2448111" cy="2772502"/>
+          </a:xfrm>
+          <a:prstGeom prst="rect">
+            <a:avLst/>
+          </a:prstGeom>
+        </p:spPr>
+      </p:pic>
+    </p:spTree>
+    <p:extLst>
+      <p:ext uri="{BB962C8B-B14F-4D97-AF65-F5344CB8AC3E}">
+        <p14:creationId xmlns:p14="http://schemas.microsoft.com/office/powerpoint/2010/main" val="2483038078"/>
+      </p:ext>
+    </p:extLst>
+  </p:cSld>
+  <p:clrMapOvr>
+    <a:masterClrMapping/>
+  </p:clrMapOvr>
+</p:sld>
+</file>
+
 <file path=ppt/theme/theme1.xml><?xml version="1.0" encoding="utf-8"?>
 <a:theme xmlns:a="http://schemas.openxmlformats.org/drawingml/2006/main" name="Office Theme">
   <a:themeElements>

</xml_diff>